<commit_message>
ppt and docx doc. updated
</commit_message>
<xml_diff>
--- a/Data_Lake_Construction_and_Querying_With_PySpark.pptx
+++ b/Data_Lake_Construction_and_Querying_With_PySpark.pptx
@@ -6692,7 +6692,7 @@
           <a:p>
             <a:pPr algn="ctr"/>
             <a:r>
-              <a:rPr lang="en-IN" sz="4400" dirty="0">
+              <a:rPr lang="en-IN" sz="4800" dirty="0">
                 <a:latin typeface="Calibri" panose="020F0502020204030204" pitchFamily="34" charset="0"/>
                 <a:ea typeface="Calibri" panose="020F0502020204030204" pitchFamily="34" charset="0"/>
                 <a:cs typeface="Calibri" panose="020F0502020204030204" pitchFamily="34" charset="0"/>
@@ -6700,33 +6700,41 @@
               <a:t>			</a:t>
             </a:r>
             <a:br>
-              <a:rPr lang="en-IN" sz="4400" dirty="0">
+              <a:rPr lang="en-IN" sz="4800" dirty="0">
                 <a:latin typeface="Calibri" panose="020F0502020204030204" pitchFamily="34" charset="0"/>
                 <a:ea typeface="Calibri" panose="020F0502020204030204" pitchFamily="34" charset="0"/>
                 <a:cs typeface="Calibri" panose="020F0502020204030204" pitchFamily="34" charset="0"/>
               </a:rPr>
             </a:br>
             <a:br>
-              <a:rPr lang="en-IN" sz="4400" dirty="0">
+              <a:rPr lang="en-IN" sz="4800" dirty="0">
                 <a:latin typeface="Calibri" panose="020F0502020204030204" pitchFamily="34" charset="0"/>
                 <a:ea typeface="Calibri" panose="020F0502020204030204" pitchFamily="34" charset="0"/>
                 <a:cs typeface="Calibri" panose="020F0502020204030204" pitchFamily="34" charset="0"/>
               </a:rPr>
             </a:br>
             <a:br>
-              <a:rPr lang="en-IN" sz="4400" dirty="0">
+              <a:rPr lang="en-IN" sz="4800">
                 <a:latin typeface="Calibri" panose="020F0502020204030204" pitchFamily="34" charset="0"/>
                 <a:ea typeface="Calibri" panose="020F0502020204030204" pitchFamily="34" charset="0"/>
                 <a:cs typeface="Calibri" panose="020F0502020204030204" pitchFamily="34" charset="0"/>
               </a:rPr>
             </a:br>
             <a:r>
-              <a:rPr lang="en-IN" sz="4400" dirty="0">
+              <a:rPr lang="en-IN" sz="4800">
                 <a:latin typeface="Calibri" panose="020F0502020204030204" pitchFamily="34" charset="0"/>
                 <a:ea typeface="Calibri" panose="020F0502020204030204" pitchFamily="34" charset="0"/>
                 <a:cs typeface="Calibri" panose="020F0502020204030204" pitchFamily="34" charset="0"/>
               </a:rPr>
-              <a:t>THANK YOU</a:t>
+              <a:t>THANK </a:t>
+            </a:r>
+            <a:r>
+              <a:rPr lang="en-IN" sz="4800" dirty="0">
+                <a:latin typeface="Calibri" panose="020F0502020204030204" pitchFamily="34" charset="0"/>
+                <a:ea typeface="Calibri" panose="020F0502020204030204" pitchFamily="34" charset="0"/>
+                <a:cs typeface="Calibri" panose="020F0502020204030204" pitchFamily="34" charset="0"/>
+              </a:rPr>
+              <a:t>YOU</a:t>
             </a:r>
           </a:p>
         </p:txBody>
@@ -7385,11 +7393,13 @@
         <p:spPr>
           <a:xfrm>
             <a:off x="677334" y="609600"/>
-            <a:ext cx="8596668" cy="698064"/>
+            <a:ext cx="8596668" cy="568751"/>
           </a:xfrm>
         </p:spPr>
         <p:txBody>
-          <a:bodyPr/>
+          <a:bodyPr>
+            <a:normAutofit fontScale="90000"/>
+          </a:bodyPr>
           <a:lstStyle/>
           <a:p>
             <a:r>
@@ -7403,51 +7413,12 @@
           </a:p>
         </p:txBody>
       </p:sp>
-      <p:sp>
-        <p:nvSpPr>
-          <p:cNvPr id="3" name="TextBox 2">
+      <p:pic>
+        <p:nvPicPr>
+          <p:cNvPr id="10" name="Content Placeholder 9">
             <a:extLst>
               <a:ext uri="{FF2B5EF4-FFF2-40B4-BE49-F238E27FC236}">
-                <a16:creationId xmlns:a16="http://schemas.microsoft.com/office/drawing/2014/main" id="{55B0CB99-F7D1-AF64-2744-BB68FDC06080}"/>
-              </a:ext>
-            </a:extLst>
-          </p:cNvPr>
-          <p:cNvSpPr txBox="1"/>
-          <p:nvPr/>
-        </p:nvSpPr>
-        <p:spPr>
-          <a:xfrm>
-            <a:off x="904973" y="1564849"/>
-            <a:ext cx="4383464" cy="338554"/>
-          </a:xfrm>
-          <a:prstGeom prst="rect">
-            <a:avLst/>
-          </a:prstGeom>
-          <a:noFill/>
-        </p:spPr>
-        <p:txBody>
-          <a:bodyPr wrap="square" rtlCol="0">
-            <a:spAutoFit/>
-          </a:bodyPr>
-          <a:lstStyle/>
-          <a:p>
-            <a:r>
-              <a:rPr lang="en-IN" sz="1600" b="1" dirty="0">
-                <a:latin typeface="Calibri" panose="020F0502020204030204" pitchFamily="34" charset="0"/>
-                <a:ea typeface="Calibri" panose="020F0502020204030204" pitchFamily="34" charset="0"/>
-                <a:cs typeface="Calibri" panose="020F0502020204030204" pitchFamily="34" charset="0"/>
-              </a:rPr>
-              <a:t>Data Lake Architecture Overview</a:t>
-            </a:r>
-          </a:p>
-        </p:txBody>
-      </p:sp>
-      <p:pic>
-        <p:nvPicPr>
-          <p:cNvPr id="8" name="Content Placeholder 7">
-            <a:extLst>
-              <a:ext uri="{FF2B5EF4-FFF2-40B4-BE49-F238E27FC236}">
-                <a16:creationId xmlns:a16="http://schemas.microsoft.com/office/drawing/2014/main" id="{51056971-D426-63D9-3722-DF44EB2F87F8}"/>
+                <a16:creationId xmlns:a16="http://schemas.microsoft.com/office/drawing/2014/main" id="{BF1FDA1D-FEE3-80DD-6727-FFC31C53BCB3}"/>
               </a:ext>
             </a:extLst>
           </p:cNvPr>
@@ -7466,8 +7437,8 @@
         </p:blipFill>
         <p:spPr>
           <a:xfrm>
-            <a:off x="1150070" y="1979629"/>
-            <a:ext cx="7720553" cy="4157220"/>
+            <a:off x="677334" y="1422638"/>
+            <a:ext cx="8438386" cy="4214591"/>
           </a:xfrm>
         </p:spPr>
       </p:pic>

</xml_diff>

<commit_message>
word and ppt doc. updated
</commit_message>
<xml_diff>
--- a/Data_Lake_Construction_and_Querying_With_PySpark.pptx
+++ b/Data_Lake_Construction_and_Querying_With_PySpark.pptx
@@ -846,7 +846,7 @@
           <a:p>
             <a:fld id="{6C75944D-E021-42A1-842E-4A047290AC38}" type="datetimeFigureOut">
               <a:rPr lang="en-IN" smtClean="0"/>
-              <a:t>29-11-2024</a:t>
+              <a:t>04-12-2024</a:t>
             </a:fld>
             <a:endParaRPr lang="en-IN"/>
           </a:p>
@@ -1097,7 +1097,7 @@
           <a:p>
             <a:fld id="{6C75944D-E021-42A1-842E-4A047290AC38}" type="datetimeFigureOut">
               <a:rPr lang="en-IN" smtClean="0"/>
-              <a:t>29-11-2024</a:t>
+              <a:t>04-12-2024</a:t>
             </a:fld>
             <a:endParaRPr lang="en-IN"/>
           </a:p>
@@ -1411,7 +1411,7 @@
           <a:p>
             <a:fld id="{6C75944D-E021-42A1-842E-4A047290AC38}" type="datetimeFigureOut">
               <a:rPr lang="en-IN" smtClean="0"/>
-              <a:t>29-11-2024</a:t>
+              <a:t>04-12-2024</a:t>
             </a:fld>
             <a:endParaRPr lang="en-IN"/>
           </a:p>
@@ -1752,7 +1752,7 @@
           <a:p>
             <a:fld id="{6C75944D-E021-42A1-842E-4A047290AC38}" type="datetimeFigureOut">
               <a:rPr lang="en-IN" smtClean="0"/>
-              <a:t>29-11-2024</a:t>
+              <a:t>04-12-2024</a:t>
             </a:fld>
             <a:endParaRPr lang="en-IN"/>
           </a:p>
@@ -2066,7 +2066,7 @@
           <a:p>
             <a:fld id="{6C75944D-E021-42A1-842E-4A047290AC38}" type="datetimeFigureOut">
               <a:rPr lang="en-IN" smtClean="0"/>
-              <a:t>29-11-2024</a:t>
+              <a:t>04-12-2024</a:t>
             </a:fld>
             <a:endParaRPr lang="en-IN"/>
           </a:p>
@@ -2459,7 +2459,7 @@
           <a:p>
             <a:fld id="{6C75944D-E021-42A1-842E-4A047290AC38}" type="datetimeFigureOut">
               <a:rPr lang="en-IN" smtClean="0"/>
-              <a:t>29-11-2024</a:t>
+              <a:t>04-12-2024</a:t>
             </a:fld>
             <a:endParaRPr lang="en-IN"/>
           </a:p>
@@ -2629,7 +2629,7 @@
           <a:p>
             <a:fld id="{6C75944D-E021-42A1-842E-4A047290AC38}" type="datetimeFigureOut">
               <a:rPr lang="en-IN" smtClean="0"/>
-              <a:t>29-11-2024</a:t>
+              <a:t>04-12-2024</a:t>
             </a:fld>
             <a:endParaRPr lang="en-IN"/>
           </a:p>
@@ -2809,7 +2809,7 @@
           <a:p>
             <a:fld id="{6C75944D-E021-42A1-842E-4A047290AC38}" type="datetimeFigureOut">
               <a:rPr lang="en-IN" smtClean="0"/>
-              <a:t>29-11-2024</a:t>
+              <a:t>04-12-2024</a:t>
             </a:fld>
             <a:endParaRPr lang="en-IN"/>
           </a:p>
@@ -2985,7 +2985,7 @@
           <a:p>
             <a:fld id="{6C75944D-E021-42A1-842E-4A047290AC38}" type="datetimeFigureOut">
               <a:rPr lang="en-IN" smtClean="0"/>
-              <a:t>29-11-2024</a:t>
+              <a:t>04-12-2024</a:t>
             </a:fld>
             <a:endParaRPr lang="en-IN"/>
           </a:p>
@@ -3232,7 +3232,7 @@
           <a:p>
             <a:fld id="{6C75944D-E021-42A1-842E-4A047290AC38}" type="datetimeFigureOut">
               <a:rPr lang="en-IN" smtClean="0"/>
-              <a:t>29-11-2024</a:t>
+              <a:t>04-12-2024</a:t>
             </a:fld>
             <a:endParaRPr lang="en-IN"/>
           </a:p>
@@ -3464,7 +3464,7 @@
           <a:p>
             <a:fld id="{6C75944D-E021-42A1-842E-4A047290AC38}" type="datetimeFigureOut">
               <a:rPr lang="en-IN" smtClean="0"/>
-              <a:t>29-11-2024</a:t>
+              <a:t>04-12-2024</a:t>
             </a:fld>
             <a:endParaRPr lang="en-IN"/>
           </a:p>
@@ -3838,7 +3838,7 @@
           <a:p>
             <a:fld id="{6C75944D-E021-42A1-842E-4A047290AC38}" type="datetimeFigureOut">
               <a:rPr lang="en-IN" smtClean="0"/>
-              <a:t>29-11-2024</a:t>
+              <a:t>04-12-2024</a:t>
             </a:fld>
             <a:endParaRPr lang="en-IN"/>
           </a:p>
@@ -3961,7 +3961,7 @@
           <a:p>
             <a:fld id="{6C75944D-E021-42A1-842E-4A047290AC38}" type="datetimeFigureOut">
               <a:rPr lang="en-IN" smtClean="0"/>
-              <a:t>29-11-2024</a:t>
+              <a:t>04-12-2024</a:t>
             </a:fld>
             <a:endParaRPr lang="en-IN"/>
           </a:p>
@@ -4056,7 +4056,7 @@
           <a:p>
             <a:fld id="{6C75944D-E021-42A1-842E-4A047290AC38}" type="datetimeFigureOut">
               <a:rPr lang="en-IN" smtClean="0"/>
-              <a:t>29-11-2024</a:t>
+              <a:t>04-12-2024</a:t>
             </a:fld>
             <a:endParaRPr lang="en-IN"/>
           </a:p>
@@ -4311,7 +4311,7 @@
           <a:p>
             <a:fld id="{6C75944D-E021-42A1-842E-4A047290AC38}" type="datetimeFigureOut">
               <a:rPr lang="en-IN" smtClean="0"/>
-              <a:t>29-11-2024</a:t>
+              <a:t>04-12-2024</a:t>
             </a:fld>
             <a:endParaRPr lang="en-IN"/>
           </a:p>
@@ -4574,7 +4574,7 @@
           <a:p>
             <a:fld id="{6C75944D-E021-42A1-842E-4A047290AC38}" type="datetimeFigureOut">
               <a:rPr lang="en-IN" smtClean="0"/>
-              <a:t>29-11-2024</a:t>
+              <a:t>04-12-2024</a:t>
             </a:fld>
             <a:endParaRPr lang="en-IN"/>
           </a:p>
@@ -5317,7 +5317,7 @@
           <a:p>
             <a:fld id="{6C75944D-E021-42A1-842E-4A047290AC38}" type="datetimeFigureOut">
               <a:rPr lang="en-IN" smtClean="0"/>
-              <a:t>29-11-2024</a:t>
+              <a:t>04-12-2024</a:t>
             </a:fld>
             <a:endParaRPr lang="en-IN"/>
           </a:p>
@@ -5897,15 +5897,40 @@
         </p:nvSpPr>
         <p:spPr>
           <a:xfrm>
-            <a:off x="1507067" y="3091993"/>
-            <a:ext cx="7766936" cy="2055740"/>
+            <a:off x="1507067" y="2865748"/>
+            <a:ext cx="7766936" cy="2281985"/>
           </a:xfrm>
         </p:spPr>
         <p:txBody>
           <a:bodyPr>
-            <a:normAutofit/>
+            <a:normAutofit lnSpcReduction="10000"/>
           </a:bodyPr>
           <a:lstStyle/>
+          <a:p>
+            <a:pPr lvl="5" algn="l"/>
+            <a:r>
+              <a:rPr lang="en-US" sz="2400" b="1" dirty="0">
+                <a:solidFill>
+                  <a:schemeClr val="tx1"/>
+                </a:solidFill>
+                <a:latin typeface="Calibri" panose="020F0502020204030204" pitchFamily="34" charset="0"/>
+                <a:ea typeface="Calibri" panose="020F0502020204030204" pitchFamily="34" charset="0"/>
+                <a:cs typeface="Calibri" panose="020F0502020204030204" pitchFamily="34" charset="0"/>
+              </a:rPr>
+              <a:t>Team Name: </a:t>
+            </a:r>
+            <a:r>
+              <a:rPr lang="en-US" sz="2400" dirty="0">
+                <a:solidFill>
+                  <a:schemeClr val="tx1"/>
+                </a:solidFill>
+                <a:latin typeface="Calibri" panose="020F0502020204030204" pitchFamily="34" charset="0"/>
+                <a:ea typeface="Calibri" panose="020F0502020204030204" pitchFamily="34" charset="0"/>
+                <a:cs typeface="Calibri" panose="020F0502020204030204" pitchFamily="34" charset="0"/>
+              </a:rPr>
+              <a:t>PySpark Pioneers</a:t>
+            </a:r>
+          </a:p>
           <a:p>
             <a:pPr lvl="5" algn="l"/>
             <a:r>
@@ -6421,7 +6446,7 @@
               <a:buNone/>
             </a:pPr>
             <a:r>
-              <a:rPr lang="en-US" sz="1600" b="1" dirty="0">
+              <a:rPr lang="en-US" sz="2000" b="1" dirty="0">
                 <a:latin typeface="Calibri" panose="020F0502020204030204" pitchFamily="34" charset="0"/>
                 <a:ea typeface="Calibri" panose="020F0502020204030204" pitchFamily="34" charset="0"/>
                 <a:cs typeface="Calibri" panose="020F0502020204030204" pitchFamily="34" charset="0"/>
@@ -6429,7 +6454,7 @@
               <a:t>Key Takeaways:</a:t>
             </a:r>
             <a:r>
-              <a:rPr lang="en-US" sz="1600" dirty="0">
+              <a:rPr lang="en-US" sz="2000" dirty="0">
                 <a:latin typeface="Calibri" panose="020F0502020204030204" pitchFamily="34" charset="0"/>
                 <a:ea typeface="Calibri" panose="020F0502020204030204" pitchFamily="34" charset="0"/>
                 <a:cs typeface="Calibri" panose="020F0502020204030204" pitchFamily="34" charset="0"/>
@@ -6630,13 +6655,18 @@
           <a:lstStyle/>
           <a:p>
             <a:r>
-              <a:rPr lang="en-IN" sz="3200" dirty="0">
+              <a:rPr lang="en-IN" sz="3200">
                 <a:latin typeface="Calibri" panose="020F0502020204030204" pitchFamily="34" charset="0"/>
                 <a:ea typeface="Calibri" panose="020F0502020204030204" pitchFamily="34" charset="0"/>
                 <a:cs typeface="Calibri" panose="020F0502020204030204" pitchFamily="34" charset="0"/>
               </a:rPr>
-              <a:t>Challengers</a:t>
-            </a:r>
+              <a:t>Challenges</a:t>
+            </a:r>
+            <a:endParaRPr lang="en-IN" sz="3200" dirty="0">
+              <a:latin typeface="Calibri" panose="020F0502020204030204" pitchFamily="34" charset="0"/>
+              <a:ea typeface="Calibri" panose="020F0502020204030204" pitchFamily="34" charset="0"/>
+              <a:cs typeface="Calibri" panose="020F0502020204030204" pitchFamily="34" charset="0"/>
+            </a:endParaRPr>
           </a:p>
         </p:txBody>
       </p:sp>

</xml_diff>